<commit_message>
Update doc and cleanup
</commit_message>
<xml_diff>
--- a/Doc/hackathon_prsn_ms.pptx
+++ b/Doc/hackathon_prsn_ms.pptx
@@ -119,7 +119,7 @@
 <file path=ppt/revisionInfo.xml><?xml version="1.0" encoding="utf-8"?>
 <p1510:revInfo xmlns:a="http://schemas.openxmlformats.org/drawingml/2006/main" xmlns:r="http://schemas.openxmlformats.org/officeDocument/2006/relationships" xmlns:p1510="http://schemas.microsoft.com/office/powerpoint/2015/10/main">
   <p1510:revLst>
-    <p1510:client id="{0203F36B-5754-4CF9-AA1E-251490C4C7F4}" v="5" dt="2022-05-09T08:22:10.261"/>
+    <p1510:client id="{64A5CFF4-9B17-4CF9-91C2-ABF0F1F04C58}" v="13" dt="2022-05-19T06:03:32.271"/>
   </p1510:revLst>
 </p1510:revInfo>
 </file>
@@ -1902,7 +1902,7 @@
           <a:lstStyle/>
           <a:p>
             <a:pPr algn="r"/>
-            <a:fld id="{E1EF3981-5EF0-4B96-BFEC-10B449DE050C}" type="slidenum">
+            <a:fld id="{073E9FF1-BF17-4B9B-BC21-B3F815EBDBC7}" type="slidenum">
               <a:rPr lang="en-IN" sz="1400" b="0" strike="noStrike" spc="-1">
                 <a:latin typeface="Times New Roman"/>
               </a:rPr>
@@ -2525,7 +2525,7 @@
               <a:buChar char=""/>
             </a:pPr>
             <a:r>
-              <a:rPr lang="en-IN" sz="2000" b="0" strike="noStrike" spc="-1" dirty="0">
+              <a:rPr lang="en-IN" sz="2400" b="0" strike="noStrike" spc="-1" dirty="0">
                 <a:latin typeface="Arial"/>
               </a:rPr>
               <a:t>Health and wellbeing are central to the human experience</a:t>
@@ -2544,7 +2544,7 @@
               <a:buChar char=""/>
             </a:pPr>
             <a:r>
-              <a:rPr lang="en-IN" sz="2000" b="0" strike="noStrike" spc="-1" dirty="0">
+              <a:rPr lang="en-IN" sz="2400" b="0" strike="noStrike" spc="-1" dirty="0">
                 <a:latin typeface="Arial"/>
               </a:rPr>
               <a:t>Yet, nine million people die every year without proper healthcare services</a:t>
@@ -2563,7 +2563,7 @@
               <a:buChar char=""/>
             </a:pPr>
             <a:r>
-              <a:rPr lang="en-IN" sz="2000" b="0" strike="noStrike" spc="-1" dirty="0">
+              <a:rPr lang="en-IN" sz="2400" b="0" strike="noStrike" spc="-1" dirty="0">
                 <a:latin typeface="Arial"/>
               </a:rPr>
               <a:t>The healthcare journey needs to be improved for everyone by reducing cost and improving accessibility</a:t>
@@ -2582,7 +2582,7 @@
               <a:buChar char=""/>
             </a:pPr>
             <a:r>
-              <a:rPr lang="en-IN" sz="2000" b="0" strike="noStrike" spc="-1" dirty="0">
+              <a:rPr lang="en-IN" sz="2400" b="0" strike="noStrike" spc="-1" dirty="0">
                 <a:latin typeface="Arial"/>
               </a:rPr>
               <a:t>AI/ML can help with accessibility, early detection and management of diseases</a:t>
@@ -2624,6 +2624,9 @@
               </a:rPr>
               <a:t>Team ATR21 Slide 2</a:t>
             </a:r>
+            <a:endParaRPr lang="en-IN" sz="1800" b="0" strike="noStrike" spc="-1">
+              <a:latin typeface="Arial"/>
+            </a:endParaRPr>
           </a:p>
         </p:txBody>
       </p:sp>
@@ -2826,6 +2829,9 @@
               </a:rPr>
               <a:t>Team ATR21 Slide 3</a:t>
             </a:r>
+            <a:endParaRPr lang="en-IN" sz="1800" b="0" strike="noStrike" spc="-1">
+              <a:latin typeface="Arial"/>
+            </a:endParaRPr>
           </a:p>
         </p:txBody>
       </p:sp>
@@ -3025,6 +3031,9 @@
               </a:rPr>
               <a:t>Team ATR21 Slide 4</a:t>
             </a:r>
+            <a:endParaRPr lang="en-IN" sz="1800" b="0" strike="noStrike" spc="-1">
+              <a:latin typeface="Arial"/>
+            </a:endParaRPr>
           </a:p>
         </p:txBody>
       </p:sp>
@@ -3100,7 +3109,7 @@
         <p:spPr>
           <a:xfrm>
             <a:off x="504000" y="1326600"/>
-            <a:ext cx="4426920" cy="3288240"/>
+            <a:ext cx="4426920" cy="3524103"/>
           </a:xfrm>
           <a:prstGeom prst="rect">
             <a:avLst/>
@@ -3112,7 +3121,7 @@
         </p:spPr>
         <p:txBody>
           <a:bodyPr lIns="0" tIns="0" rIns="0" bIns="0" anchor="t">
-            <a:normAutofit fontScale="94500"/>
+            <a:noAutofit/>
           </a:bodyPr>
           <a:lstStyle/>
           <a:p>
@@ -3158,7 +3167,7 @@
               </a:rPr>
               <a:t>heirarchy</a:t>
             </a:r>
-            <a:endParaRPr lang="en-IN" b="0" strike="noStrike" spc="-1">
+            <a:endParaRPr lang="en-IN" b="0" strike="noStrike" spc="-1" dirty="0">
               <a:latin typeface="Arial"/>
             </a:endParaRPr>
           </a:p>
@@ -3197,7 +3206,19 @@
               <a:rPr lang="en-IN" b="0" strike="noStrike" spc="-1" dirty="0">
                 <a:latin typeface="Arial"/>
               </a:rPr>
-              <a:t>Easy to use entry forms</a:t>
+              <a:t>Easy to use entry forms with option to upload </a:t>
+            </a:r>
+            <a:r>
+              <a:rPr lang="en-IN" b="0" strike="noStrike" spc="-1" dirty="0" err="1">
+                <a:latin typeface="Arial"/>
+              </a:rPr>
+              <a:t>pregenerated</a:t>
+            </a:r>
+            <a:r>
+              <a:rPr lang="en-IN" b="0" strike="noStrike" spc="-1" dirty="0">
+                <a:latin typeface="Arial"/>
+              </a:rPr>
+              <a:t> QR code</a:t>
             </a:r>
           </a:p>
           <a:p>
@@ -3244,9 +3265,49 @@
           </a:ln>
         </p:spPr>
       </p:pic>
+      <p:sp>
+        <p:nvSpPr>
+          <p:cNvPr id="55" name="TextShape 3"/>
+          <p:cNvSpPr txBox="1"/>
+          <p:nvPr/>
+        </p:nvSpPr>
+        <p:spPr>
+          <a:xfrm rot="16200000">
+            <a:off x="-964800" y="4344840"/>
+            <a:ext cx="2304000" cy="346320"/>
+          </a:xfrm>
+          <a:prstGeom prst="rect">
+            <a:avLst/>
+          </a:prstGeom>
+          <a:noFill/>
+          <a:ln>
+            <a:noFill/>
+          </a:ln>
+        </p:spPr>
+        <p:txBody>
+          <a:bodyPr lIns="90000" tIns="45000" rIns="90000" bIns="45000">
+            <a:noAutofit/>
+          </a:bodyPr>
+          <a:lstStyle/>
+          <a:p>
+            <a:r>
+              <a:rPr lang="en-IN" sz="1800" b="0" strike="noStrike" spc="-1">
+                <a:solidFill>
+                  <a:srgbClr val="CCCCCC"/>
+                </a:solidFill>
+                <a:latin typeface="Arial"/>
+              </a:rPr>
+              <a:t>Team ATR21 Slide 5</a:t>
+            </a:r>
+            <a:endParaRPr lang="en-IN" sz="1800" b="0" strike="noStrike" spc="-1">
+              <a:latin typeface="Arial"/>
+            </a:endParaRPr>
+          </a:p>
+        </p:txBody>
+      </p:sp>
       <p:pic>
         <p:nvPicPr>
-          <p:cNvPr id="55" name="Picture 54"/>
+          <p:cNvPr id="56" name="Picture 55"/>
           <p:cNvPicPr/>
           <p:nvPr/>
         </p:nvPicPr>
@@ -3256,8 +3317,8 @@
         </p:blipFill>
         <p:spPr>
           <a:xfrm>
-            <a:off x="7776000" y="1216800"/>
-            <a:ext cx="1674000" cy="3744000"/>
+            <a:off x="7719480" y="1199160"/>
+            <a:ext cx="1724400" cy="3744000"/>
           </a:xfrm>
           <a:prstGeom prst="rect">
             <a:avLst/>
@@ -3267,43 +3328,6 @@
           </a:ln>
         </p:spPr>
       </p:pic>
-      <p:sp>
-        <p:nvSpPr>
-          <p:cNvPr id="56" name="TextShape 3"/>
-          <p:cNvSpPr txBox="1"/>
-          <p:nvPr/>
-        </p:nvSpPr>
-        <p:spPr>
-          <a:xfrm rot="16200000">
-            <a:off x="-964800" y="4344840"/>
-            <a:ext cx="2304000" cy="346320"/>
-          </a:xfrm>
-          <a:prstGeom prst="rect">
-            <a:avLst/>
-          </a:prstGeom>
-          <a:noFill/>
-          <a:ln>
-            <a:noFill/>
-          </a:ln>
-        </p:spPr>
-        <p:txBody>
-          <a:bodyPr lIns="90000" tIns="45000" rIns="90000" bIns="45000">
-            <a:noAutofit/>
-          </a:bodyPr>
-          <a:lstStyle/>
-          <a:p>
-            <a:r>
-              <a:rPr lang="en-IN" sz="1800" b="0" strike="noStrike" spc="-1">
-                <a:solidFill>
-                  <a:srgbClr val="CCCCCC"/>
-                </a:solidFill>
-                <a:latin typeface="Arial"/>
-              </a:rPr>
-              <a:t>Team ATR21 Slide 5</a:t>
-            </a:r>
-          </a:p>
-        </p:txBody>
-      </p:sp>
     </p:spTree>
   </p:cSld>
   <p:clrMapOvr>
@@ -3375,8 +3399,8 @@
         </p:nvSpPr>
         <p:spPr>
           <a:xfrm>
-            <a:off x="504000" y="1326600"/>
-            <a:ext cx="4426920" cy="3288240"/>
+            <a:off x="504000" y="1257845"/>
+            <a:ext cx="4426920" cy="3622379"/>
           </a:xfrm>
           <a:prstGeom prst="rect">
             <a:avLst/>
@@ -3388,7 +3412,7 @@
         </p:spPr>
         <p:txBody>
           <a:bodyPr lIns="0" tIns="0" rIns="0" bIns="0" anchor="t">
-            <a:normAutofit fontScale="93500"/>
+            <a:noAutofit/>
           </a:bodyPr>
           <a:lstStyle/>
           <a:p>
@@ -3404,19 +3428,19 @@
               <a:buChar char=""/>
             </a:pPr>
             <a:r>
-              <a:rPr lang="en-IN" b="0" strike="noStrike" spc="-1" dirty="0">
+              <a:rPr lang="en-IN" sz="2000" b="0" strike="noStrike" spc="-1" dirty="0">
                 <a:latin typeface="Arial"/>
               </a:rPr>
               <a:t>People can get </a:t>
             </a:r>
             <a:r>
-              <a:rPr lang="en-IN" b="0" strike="noStrike" spc="-1" dirty="0" err="1">
+              <a:rPr lang="en-IN" sz="2000" b="0" strike="noStrike" spc="-1" dirty="0" err="1">
                 <a:latin typeface="Arial"/>
               </a:rPr>
               <a:t>prediagnostic</a:t>
             </a:r>
             <a:r>
-              <a:rPr lang="en-IN" b="0" strike="noStrike" spc="-1" dirty="0">
+              <a:rPr lang="en-IN" sz="2000" b="0" strike="noStrike" spc="-1" dirty="0">
                 <a:latin typeface="Arial"/>
               </a:rPr>
               <a:t> overview prior to medical consultation</a:t>
@@ -3435,19 +3459,19 @@
               <a:buChar char=""/>
             </a:pPr>
             <a:r>
-              <a:rPr lang="en-IN" b="0" strike="noStrike" spc="-1" dirty="0">
+              <a:rPr lang="en-IN" sz="2000" b="0" strike="noStrike" spc="-1" dirty="0">
                 <a:latin typeface="Arial"/>
               </a:rPr>
               <a:t>Doctors &amp; patients can save time by avoiding </a:t>
             </a:r>
             <a:r>
-              <a:rPr lang="en-IN" b="0" strike="noStrike" spc="-1" dirty="0" err="1">
+              <a:rPr lang="en-IN" sz="2000" b="0" strike="noStrike" spc="-1" dirty="0" err="1">
                 <a:latin typeface="Arial"/>
               </a:rPr>
               <a:t>prediagnostic</a:t>
             </a:r>
             <a:r>
-              <a:rPr lang="en-IN" b="0" strike="noStrike" spc="-1" dirty="0">
+              <a:rPr lang="en-IN" sz="2000" b="0" strike="noStrike" spc="-1" dirty="0">
                 <a:latin typeface="Arial"/>
               </a:rPr>
               <a:t> consultations</a:t>
@@ -3466,7 +3490,7 @@
               <a:buChar char=""/>
             </a:pPr>
             <a:r>
-              <a:rPr lang="en-IN" b="0" strike="noStrike" spc="-1" dirty="0">
+              <a:rPr lang="en-IN" sz="2000" b="0" strike="noStrike" spc="-1" dirty="0">
                 <a:latin typeface="Arial"/>
               </a:rPr>
               <a:t>Easy access anytime, anywhere and free of cost.</a:t>
@@ -3485,7 +3509,7 @@
               <a:buChar char=""/>
             </a:pPr>
             <a:r>
-              <a:rPr lang="en-IN" b="0" strike="noStrike" spc="-1" dirty="0">
+              <a:rPr lang="en-IN" sz="2000" b="0" strike="noStrike" spc="-1" dirty="0">
                 <a:latin typeface="Arial"/>
               </a:rPr>
               <a:t>Hospitals can deploy this app in kiosk mode in reception areas</a:t>
@@ -3573,6 +3597,9 @@
               </a:rPr>
               <a:t>Team ATR21 Slide 6</a:t>
             </a:r>
+            <a:endParaRPr lang="en-IN" sz="1800" b="0" strike="noStrike" spc="-1">
+              <a:latin typeface="Arial"/>
+            </a:endParaRPr>
           </a:p>
         </p:txBody>
       </p:sp>
@@ -3772,6 +3799,9 @@
               </a:rPr>
               <a:t>Team ATR21 Slide 7</a:t>
             </a:r>
+            <a:endParaRPr lang="en-IN" sz="1800" b="0" strike="noStrike" spc="-1">
+              <a:latin typeface="Arial"/>
+            </a:endParaRPr>
           </a:p>
         </p:txBody>
       </p:sp>
@@ -3878,7 +3908,7 @@
               <a:rPr lang="en-IN" sz="3200" b="0" strike="noStrike" spc="-1">
                 <a:latin typeface="Arial"/>
               </a:rPr>
-              <a:t>Anaconda version: 4.11.0</a:t>
+              <a:t>Anaconda version: 4.12.0</a:t>
             </a:r>
           </a:p>
           <a:p>
@@ -3974,6 +4004,9 @@
               </a:rPr>
               <a:t>Team ATR21 Slide 8</a:t>
             </a:r>
+            <a:endParaRPr lang="en-IN" sz="1800" b="0" strike="noStrike" spc="-1">
+              <a:latin typeface="Arial"/>
+            </a:endParaRPr>
           </a:p>
         </p:txBody>
       </p:sp>
@@ -4165,6 +4198,9 @@
               </a:rPr>
               <a:t>Team ATR21 Slide 9</a:t>
             </a:r>
+            <a:endParaRPr lang="en-IN" sz="1800" b="0" strike="noStrike" spc="-1">
+              <a:latin typeface="Arial"/>
+            </a:endParaRPr>
           </a:p>
         </p:txBody>
       </p:sp>

</xml_diff>